<commit_message>
Update video file to mp4
</commit_message>
<xml_diff>
--- a/Assign2_commentary.pptx
+++ b/Assign2_commentary.pptx
@@ -3364,6 +3364,44 @@
       </p:grpSpPr>
       <p:pic>
         <p:nvPicPr>
+          <p:cNvPr id="4" name="Recorded Sound">
+            <a:hlinkClick r:id="" action="ppaction://media"/>
+            <a:extLst>
+              <a:ext uri="{FF2B5EF4-FFF2-40B4-BE49-F238E27FC236}">
+                <a16:creationId xmlns:a16="http://schemas.microsoft.com/office/drawing/2014/main" id="{E1E575E7-7799-4BC2-A53B-393ED2413E6A}"/>
+              </a:ext>
+            </a:extLst>
+          </p:cNvPr>
+          <p:cNvPicPr>
+            <a:picLocks noChangeAspect="1"/>
+          </p:cNvPicPr>
+          <p:nvPr>
+            <a:audioFile r:link="rId2"/>
+            <p:extLst>
+              <p:ext uri="{DAA4B4D4-6D71-4841-9C94-3DE7FCFB9230}">
+                <p14:media xmlns:p14="http://schemas.microsoft.com/office/powerpoint/2010/main" r:embed="rId1"/>
+              </p:ext>
+            </p:extLst>
+          </p:nvPr>
+        </p:nvPicPr>
+        <p:blipFill>
+          <a:blip r:embed="rId4"/>
+          <a:stretch>
+            <a:fillRect/>
+          </a:stretch>
+        </p:blipFill>
+        <p:spPr>
+          <a:xfrm>
+            <a:off x="5791200" y="3124200"/>
+            <a:ext cx="609600" cy="609600"/>
+          </a:xfrm>
+          <a:prstGeom prst="rect">
+            <a:avLst/>
+          </a:prstGeom>
+        </p:spPr>
+      </p:pic>
+      <p:pic>
+        <p:nvPicPr>
           <p:cNvPr id="5" name="Picture 4">
             <a:extLst>
               <a:ext uri="{FF2B5EF4-FFF2-40B4-BE49-F238E27FC236}">
@@ -3377,7 +3415,7 @@
           <p:nvPr/>
         </p:nvPicPr>
         <p:blipFill>
-          <a:blip r:embed="rId4">
+          <a:blip r:embed="rId5">
             <a:extLst>
               <a:ext uri="{28A0092B-C50C-407E-A947-70E740481C1C}">
                 <a14:useLocalDpi xmlns:a14="http://schemas.microsoft.com/office/drawing/2010/main" val="0"/>
@@ -3392,44 +3430,6 @@
           <a:xfrm>
             <a:off x="0" y="177800"/>
             <a:ext cx="12191999" cy="6502400"/>
-          </a:xfrm>
-          <a:prstGeom prst="rect">
-            <a:avLst/>
-          </a:prstGeom>
-        </p:spPr>
-      </p:pic>
-      <p:pic>
-        <p:nvPicPr>
-          <p:cNvPr id="4" name="Recorded Sound">
-            <a:hlinkClick r:id="" action="ppaction://media"/>
-            <a:extLst>
-              <a:ext uri="{FF2B5EF4-FFF2-40B4-BE49-F238E27FC236}">
-                <a16:creationId xmlns:a16="http://schemas.microsoft.com/office/drawing/2014/main" id="{E1E575E7-7799-4BC2-A53B-393ED2413E6A}"/>
-              </a:ext>
-            </a:extLst>
-          </p:cNvPr>
-          <p:cNvPicPr>
-            <a:picLocks noChangeAspect="1"/>
-          </p:cNvPicPr>
-          <p:nvPr>
-            <a:audioFile r:link="rId2"/>
-            <p:extLst>
-              <p:ext uri="{DAA4B4D4-6D71-4841-9C94-3DE7FCFB9230}">
-                <p14:media xmlns:p14="http://schemas.microsoft.com/office/powerpoint/2010/main" r:embed="rId1"/>
-              </p:ext>
-            </p:extLst>
-          </p:nvPr>
-        </p:nvPicPr>
-        <p:blipFill>
-          <a:blip r:embed="rId5"/>
-          <a:stretch>
-            <a:fillRect/>
-          </a:stretch>
-        </p:blipFill>
-        <p:spPr>
-          <a:xfrm>
-            <a:off x="5791200" y="3124200"/>
-            <a:ext cx="609600" cy="609600"/>
           </a:xfrm>
           <a:prstGeom prst="rect">
             <a:avLst/>

</xml_diff>